<commit_message>
Functional MainWindow-UI created.. Pimp up later..
</commit_message>
<xml_diff>
--- a/documentation_de/TweetFarmerDB.pptx
+++ b/documentation_de/TweetFarmerDB.pptx
@@ -110,6 +110,11 @@
       </a:defRPr>
     </a:lvl9pPr>
   </p:defaultTextStyle>
+  <p:extLst>
+    <p:ext uri="{EFAFB233-063F-42B5-8137-9DF3F51BA10A}">
+      <p15:sldGuideLst xmlns:p15="http://schemas.microsoft.com/office/powerpoint/2012/main"/>
+    </p:ext>
+  </p:extLst>
 </p:presentation>
 </file>
 
@@ -6613,7 +6618,7 @@
             <a:pPr algn="ctr"/>
             <a:r>
               <a:rPr lang="de-DE" dirty="0"/>
-              <a:t>Filter Übersicht</a:t>
+              <a:t>Text Mining Fortschritte</a:t>
             </a:r>
           </a:p>
         </p:txBody>

</xml_diff>